<commit_message>
Verkabelung ergänzt mit Infos vom Forum
</commit_message>
<xml_diff>
--- a/oriDocs/Verkabelung.pptx
+++ b/oriDocs/Verkabelung.pptx
@@ -367,7 +367,7 @@
           <a:p>
             <a:fld id="{E679DB1F-D61D-433C-BF0D-19DF96EA831A}" type="datetimeFigureOut">
               <a:rPr lang="de-DE" smtClean="0"/>
-              <a:t>11.01.2020</a:t>
+              <a:t>21.01.2020</a:t>
             </a:fld>
             <a:endParaRPr lang="de-DE"/>
           </a:p>
@@ -875,7 +875,7 @@
           <a:p>
             <a:fld id="{89028E9F-3905-4325-8FE4-24BE77D686F8}" type="datetimeFigureOut">
               <a:rPr lang="de-DE" smtClean="0"/>
-              <a:t>11.01.2020</a:t>
+              <a:t>21.01.2020</a:t>
             </a:fld>
             <a:endParaRPr lang="de-DE"/>
           </a:p>
@@ -1045,7 +1045,7 @@
           <a:p>
             <a:fld id="{89028E9F-3905-4325-8FE4-24BE77D686F8}" type="datetimeFigureOut">
               <a:rPr lang="de-DE" smtClean="0"/>
-              <a:t>11.01.2020</a:t>
+              <a:t>21.01.2020</a:t>
             </a:fld>
             <a:endParaRPr lang="de-DE"/>
           </a:p>
@@ -1225,7 +1225,7 @@
           <a:p>
             <a:fld id="{89028E9F-3905-4325-8FE4-24BE77D686F8}" type="datetimeFigureOut">
               <a:rPr lang="de-DE" smtClean="0"/>
-              <a:t>11.01.2020</a:t>
+              <a:t>21.01.2020</a:t>
             </a:fld>
             <a:endParaRPr lang="de-DE"/>
           </a:p>
@@ -1395,7 +1395,7 @@
           <a:p>
             <a:fld id="{89028E9F-3905-4325-8FE4-24BE77D686F8}" type="datetimeFigureOut">
               <a:rPr lang="de-DE" smtClean="0"/>
-              <a:t>11.01.2020</a:t>
+              <a:t>21.01.2020</a:t>
             </a:fld>
             <a:endParaRPr lang="de-DE"/>
           </a:p>
@@ -1639,7 +1639,7 @@
           <a:p>
             <a:fld id="{89028E9F-3905-4325-8FE4-24BE77D686F8}" type="datetimeFigureOut">
               <a:rPr lang="de-DE" smtClean="0"/>
-              <a:t>11.01.2020</a:t>
+              <a:t>21.01.2020</a:t>
             </a:fld>
             <a:endParaRPr lang="de-DE"/>
           </a:p>
@@ -1871,7 +1871,7 @@
           <a:p>
             <a:fld id="{89028E9F-3905-4325-8FE4-24BE77D686F8}" type="datetimeFigureOut">
               <a:rPr lang="de-DE" smtClean="0"/>
-              <a:t>11.01.2020</a:t>
+              <a:t>21.01.2020</a:t>
             </a:fld>
             <a:endParaRPr lang="de-DE"/>
           </a:p>
@@ -2238,7 +2238,7 @@
           <a:p>
             <a:fld id="{89028E9F-3905-4325-8FE4-24BE77D686F8}" type="datetimeFigureOut">
               <a:rPr lang="de-DE" smtClean="0"/>
-              <a:t>11.01.2020</a:t>
+              <a:t>21.01.2020</a:t>
             </a:fld>
             <a:endParaRPr lang="de-DE"/>
           </a:p>
@@ -2356,7 +2356,7 @@
           <a:p>
             <a:fld id="{89028E9F-3905-4325-8FE4-24BE77D686F8}" type="datetimeFigureOut">
               <a:rPr lang="de-DE" smtClean="0"/>
-              <a:t>11.01.2020</a:t>
+              <a:t>21.01.2020</a:t>
             </a:fld>
             <a:endParaRPr lang="de-DE"/>
           </a:p>
@@ -2451,7 +2451,7 @@
           <a:p>
             <a:fld id="{89028E9F-3905-4325-8FE4-24BE77D686F8}" type="datetimeFigureOut">
               <a:rPr lang="de-DE" smtClean="0"/>
-              <a:t>11.01.2020</a:t>
+              <a:t>21.01.2020</a:t>
             </a:fld>
             <a:endParaRPr lang="de-DE"/>
           </a:p>
@@ -2728,7 +2728,7 @@
           <a:p>
             <a:fld id="{89028E9F-3905-4325-8FE4-24BE77D686F8}" type="datetimeFigureOut">
               <a:rPr lang="de-DE" smtClean="0"/>
-              <a:t>11.01.2020</a:t>
+              <a:t>21.01.2020</a:t>
             </a:fld>
             <a:endParaRPr lang="de-DE"/>
           </a:p>
@@ -2985,7 +2985,7 @@
           <a:p>
             <a:fld id="{89028E9F-3905-4325-8FE4-24BE77D686F8}" type="datetimeFigureOut">
               <a:rPr lang="de-DE" smtClean="0"/>
-              <a:t>11.01.2020</a:t>
+              <a:t>21.01.2020</a:t>
             </a:fld>
             <a:endParaRPr lang="de-DE"/>
           </a:p>
@@ -3198,7 +3198,7 @@
           <a:p>
             <a:fld id="{89028E9F-3905-4325-8FE4-24BE77D686F8}" type="datetimeFigureOut">
               <a:rPr lang="de-DE" smtClean="0"/>
-              <a:t>11.01.2020</a:t>
+              <a:t>21.01.2020</a:t>
             </a:fld>
             <a:endParaRPr lang="de-DE"/>
           </a:p>
@@ -3605,10 +3605,10 @@
       </p:grpSpPr>
       <p:sp>
         <p:nvSpPr>
-          <p:cNvPr id="89" name="Rectangle: Rounded Corners 88">
+          <p:cNvPr id="90" name="Rectangle: Rounded Corners 89">
             <a:extLst>
               <a:ext uri="{FF2B5EF4-FFF2-40B4-BE49-F238E27FC236}">
-                <a16:creationId xmlns:a16="http://schemas.microsoft.com/office/drawing/2014/main" id="{13F513E2-EAED-4580-83EB-B155A0CE11F9}"/>
+                <a16:creationId xmlns:a16="http://schemas.microsoft.com/office/drawing/2014/main" id="{0386B17D-4A47-4DAB-B588-B22633359CEC}"/>
               </a:ext>
             </a:extLst>
           </p:cNvPr>
@@ -3617,8 +3617,132 @@
         </p:nvSpPr>
         <p:spPr>
           <a:xfrm>
-            <a:off x="4835764" y="102665"/>
-            <a:ext cx="3854150" cy="1174547"/>
+            <a:off x="291157" y="3120631"/>
+            <a:ext cx="8526390" cy="3537550"/>
+          </a:xfrm>
+          <a:prstGeom prst="roundRect">
+            <a:avLst>
+              <a:gd name="adj" fmla="val 10684"/>
+            </a:avLst>
+          </a:prstGeom>
+          <a:solidFill>
+            <a:schemeClr val="accent1">
+              <a:lumMod val="20000"/>
+              <a:lumOff val="80000"/>
+            </a:schemeClr>
+          </a:solidFill>
+          <a:ln>
+            <a:noFill/>
+          </a:ln>
+        </p:spPr>
+        <p:style>
+          <a:lnRef idx="3">
+            <a:schemeClr val="lt1"/>
+          </a:lnRef>
+          <a:fillRef idx="1">
+            <a:schemeClr val="accent3"/>
+          </a:fillRef>
+          <a:effectRef idx="1">
+            <a:schemeClr val="accent3"/>
+          </a:effectRef>
+          <a:fontRef idx="minor">
+            <a:schemeClr val="lt1"/>
+          </a:fontRef>
+        </p:style>
+        <p:txBody>
+          <a:bodyPr rtlCol="0" anchor="t"/>
+          <a:lstStyle/>
+          <a:p>
+            <a:pPr algn="r"/>
+            <a:endParaRPr lang="de-DE" sz="1600" dirty="0">
+              <a:solidFill>
+                <a:schemeClr val="tx1">
+                  <a:lumMod val="65000"/>
+                  <a:lumOff val="35000"/>
+                </a:schemeClr>
+              </a:solidFill>
+            </a:endParaRPr>
+          </a:p>
+        </p:txBody>
+      </p:sp>
+      <p:sp>
+        <p:nvSpPr>
+          <p:cNvPr id="91" name="Rectangle: Rounded Corners 90">
+            <a:extLst>
+              <a:ext uri="{FF2B5EF4-FFF2-40B4-BE49-F238E27FC236}">
+                <a16:creationId xmlns:a16="http://schemas.microsoft.com/office/drawing/2014/main" id="{2EEA9354-08AF-4E64-96FD-EB0DA409DEC1}"/>
+              </a:ext>
+            </a:extLst>
+          </p:cNvPr>
+          <p:cNvSpPr/>
+          <p:nvPr/>
+        </p:nvSpPr>
+        <p:spPr>
+          <a:xfrm>
+            <a:off x="5385336" y="1221246"/>
+            <a:ext cx="3434103" cy="3135119"/>
+          </a:xfrm>
+          <a:prstGeom prst="roundRect">
+            <a:avLst>
+              <a:gd name="adj" fmla="val 10726"/>
+            </a:avLst>
+          </a:prstGeom>
+          <a:solidFill>
+            <a:schemeClr val="accent1">
+              <a:lumMod val="20000"/>
+              <a:lumOff val="80000"/>
+            </a:schemeClr>
+          </a:solidFill>
+          <a:ln>
+            <a:noFill/>
+          </a:ln>
+        </p:spPr>
+        <p:style>
+          <a:lnRef idx="3">
+            <a:schemeClr val="lt1"/>
+          </a:lnRef>
+          <a:fillRef idx="1">
+            <a:schemeClr val="accent3"/>
+          </a:fillRef>
+          <a:effectRef idx="1">
+            <a:schemeClr val="accent3"/>
+          </a:effectRef>
+          <a:fontRef idx="minor">
+            <a:schemeClr val="lt1"/>
+          </a:fontRef>
+        </p:style>
+        <p:txBody>
+          <a:bodyPr rtlCol="0" anchor="t"/>
+          <a:lstStyle/>
+          <a:p>
+            <a:pPr algn="r"/>
+            <a:endParaRPr lang="de-DE" sz="1600" dirty="0">
+              <a:solidFill>
+                <a:schemeClr val="tx1">
+                  <a:lumMod val="65000"/>
+                  <a:lumOff val="35000"/>
+                </a:schemeClr>
+              </a:solidFill>
+            </a:endParaRPr>
+          </a:p>
+        </p:txBody>
+      </p:sp>
+      <p:sp>
+        <p:nvSpPr>
+          <p:cNvPr id="93" name="Rectangle: Rounded Corners 92">
+            <a:extLst>
+              <a:ext uri="{FF2B5EF4-FFF2-40B4-BE49-F238E27FC236}">
+                <a16:creationId xmlns:a16="http://schemas.microsoft.com/office/drawing/2014/main" id="{4507D48B-8FAF-4349-9C86-45DBAE88F631}"/>
+              </a:ext>
+            </a:extLst>
+          </p:cNvPr>
+          <p:cNvSpPr/>
+          <p:nvPr/>
+        </p:nvSpPr>
+        <p:spPr>
+          <a:xfrm>
+            <a:off x="269657" y="118907"/>
+            <a:ext cx="4600051" cy="2840772"/>
           </a:xfrm>
           <a:prstGeom prst="roundRect">
             <a:avLst/>
@@ -3651,7 +3775,7 @@
           <a:bodyPr rtlCol="0" anchor="t"/>
           <a:lstStyle/>
           <a:p>
-            <a:pPr algn="ctr"/>
+            <a:pPr algn="r"/>
             <a:r>
               <a:rPr lang="de-DE" sz="1600" dirty="0">
                 <a:solidFill>
@@ -3661,112 +3785,30 @@
                   </a:schemeClr>
                 </a:solidFill>
               </a:rPr>
-              <a:t>Statische LED Beleuchtung</a:t>
-            </a:r>
-          </a:p>
-        </p:txBody>
-      </p:sp>
-      <p:sp>
-        <p:nvSpPr>
-          <p:cNvPr id="78" name="Rectangle: Rounded Corners 77">
+              <a:t>Digitale Stromversorgung</a:t>
+            </a:r>
+          </a:p>
+        </p:txBody>
+      </p:sp>
+      <p:cxnSp>
+        <p:nvCxnSpPr>
+          <p:cNvPr id="98" name="Straight Arrow Connector 97">
             <a:extLst>
               <a:ext uri="{FF2B5EF4-FFF2-40B4-BE49-F238E27FC236}">
-                <a16:creationId xmlns:a16="http://schemas.microsoft.com/office/drawing/2014/main" id="{CDE45503-8A52-4F32-9217-AD6BFFD3D11B}"/>
-              </a:ext>
-            </a:extLst>
-          </p:cNvPr>
-          <p:cNvSpPr/>
-          <p:nvPr/>
-        </p:nvSpPr>
-        <p:spPr>
-          <a:xfrm>
-            <a:off x="227130" y="118907"/>
-            <a:ext cx="3972892" cy="2671610"/>
-          </a:xfrm>
-          <a:prstGeom prst="roundRect">
-            <a:avLst/>
-          </a:prstGeom>
-          <a:solidFill>
-            <a:schemeClr val="accent1">
-              <a:lumMod val="20000"/>
-              <a:lumOff val="80000"/>
-            </a:schemeClr>
-          </a:solidFill>
-          <a:ln>
-            <a:noFill/>
-          </a:ln>
-        </p:spPr>
-        <p:style>
-          <a:lnRef idx="3">
-            <a:schemeClr val="lt1"/>
-          </a:lnRef>
-          <a:fillRef idx="1">
-            <a:schemeClr val="accent3"/>
-          </a:fillRef>
-          <a:effectRef idx="1">
-            <a:schemeClr val="accent3"/>
-          </a:effectRef>
-          <a:fontRef idx="minor">
-            <a:schemeClr val="lt1"/>
-          </a:fontRef>
-        </p:style>
-        <p:txBody>
-          <a:bodyPr rtlCol="0" anchor="t"/>
-          <a:lstStyle/>
-          <a:p>
-            <a:pPr algn="r"/>
-            <a:r>
-              <a:rPr lang="de-DE" sz="1600" dirty="0">
-                <a:solidFill>
-                  <a:schemeClr val="tx1">
-                    <a:lumMod val="65000"/>
-                    <a:lumOff val="35000"/>
-                  </a:schemeClr>
-                </a:solidFill>
-              </a:rPr>
-              <a:t>Digitale </a:t>
-            </a:r>
-            <a:r>
-              <a:rPr lang="de-DE" sz="1600" dirty="0" err="1">
-                <a:solidFill>
-                  <a:schemeClr val="tx1">
-                    <a:lumMod val="65000"/>
-                    <a:lumOff val="35000"/>
-                  </a:schemeClr>
-                </a:solidFill>
-              </a:rPr>
-              <a:t>Stromversogrung</a:t>
-            </a:r>
-            <a:endParaRPr lang="de-DE" sz="1600" dirty="0">
-              <a:solidFill>
-                <a:schemeClr val="tx1">
-                  <a:lumMod val="65000"/>
-                  <a:lumOff val="35000"/>
-                </a:schemeClr>
-              </a:solidFill>
-            </a:endParaRPr>
-          </a:p>
-        </p:txBody>
-      </p:sp>
-      <p:cxnSp>
-        <p:nvCxnSpPr>
-          <p:cNvPr id="65" name="Straight Arrow Connector 64">
-            <a:extLst>
-              <a:ext uri="{FF2B5EF4-FFF2-40B4-BE49-F238E27FC236}">
-                <a16:creationId xmlns:a16="http://schemas.microsoft.com/office/drawing/2014/main" id="{3D004736-DF7C-4BCB-AA5C-E9427A204FE2}"/>
+                <a16:creationId xmlns:a16="http://schemas.microsoft.com/office/drawing/2014/main" id="{8E80E846-749C-4003-9383-2EFD54B42E44}"/>
               </a:ext>
             </a:extLst>
           </p:cNvPr>
           <p:cNvCxnSpPr>
             <a:cxnSpLocks/>
-            <a:stCxn id="81" idx="2"/>
-            <a:endCxn id="54" idx="0"/>
+            <a:stCxn id="124" idx="2"/>
+            <a:endCxn id="151" idx="0"/>
           </p:cNvCxnSpPr>
           <p:nvPr/>
         </p:nvCxnSpPr>
         <p:spPr>
           <a:xfrm>
-            <a:off x="5796457" y="5171290"/>
+            <a:off x="5385336" y="4990531"/>
             <a:ext cx="18626" cy="831797"/>
           </a:xfrm>
           <a:prstGeom prst="straightConnector1">
@@ -3801,10 +3843,10 @@
       </p:cxnSp>
       <p:sp>
         <p:nvSpPr>
-          <p:cNvPr id="56" name="Rectangle: Rounded Corners 55">
+          <p:cNvPr id="99" name="Rectangle: Rounded Corners 98">
             <a:extLst>
               <a:ext uri="{FF2B5EF4-FFF2-40B4-BE49-F238E27FC236}">
-                <a16:creationId xmlns:a16="http://schemas.microsoft.com/office/drawing/2014/main" id="{648F61FD-259B-4BF5-9698-BCC5190BDEF3}"/>
+                <a16:creationId xmlns:a16="http://schemas.microsoft.com/office/drawing/2014/main" id="{782FD46F-5C36-4A20-B68B-A926A19E4D15}"/>
               </a:ext>
             </a:extLst>
           </p:cNvPr>
@@ -3813,7 +3855,7 @@
         </p:nvSpPr>
         <p:spPr>
           <a:xfrm>
-            <a:off x="389802" y="305724"/>
+            <a:off x="809786" y="342937"/>
             <a:ext cx="1099661" cy="527029"/>
           </a:xfrm>
           <a:prstGeom prst="roundRect">
@@ -3856,10 +3898,10 @@
       </p:sp>
       <p:grpSp>
         <p:nvGrpSpPr>
-          <p:cNvPr id="57" name="Group 56">
+          <p:cNvPr id="100" name="Group 99">
             <a:extLst>
               <a:ext uri="{FF2B5EF4-FFF2-40B4-BE49-F238E27FC236}">
-                <a16:creationId xmlns:a16="http://schemas.microsoft.com/office/drawing/2014/main" id="{1C239DAB-4C01-42C6-BB5E-32EDF026D1E0}"/>
+                <a16:creationId xmlns:a16="http://schemas.microsoft.com/office/drawing/2014/main" id="{FAB1DE8D-8F73-4643-BE34-A410F6CC2902}"/>
               </a:ext>
             </a:extLst>
           </p:cNvPr>
@@ -3868,7 +3910,7 @@
         </p:nvGrpSpPr>
         <p:grpSpPr>
           <a:xfrm>
-            <a:off x="7657883" y="1515131"/>
+            <a:off x="7246762" y="1334372"/>
             <a:ext cx="967495" cy="1088461"/>
             <a:chOff x="9090905" y="4721073"/>
             <a:chExt cx="967495" cy="1088461"/>
@@ -3876,10 +3918,10 @@
         </p:grpSpPr>
         <p:sp>
           <p:nvSpPr>
-            <p:cNvPr id="58" name="Rectangle: Rounded Corners 57">
+            <p:cNvPr id="101" name="Rectangle: Rounded Corners 100">
               <a:extLst>
                 <a:ext uri="{FF2B5EF4-FFF2-40B4-BE49-F238E27FC236}">
-                  <a16:creationId xmlns:a16="http://schemas.microsoft.com/office/drawing/2014/main" id="{87F64D8A-03E4-47A4-BAA8-B6564A5FB96F}"/>
+                  <a16:creationId xmlns:a16="http://schemas.microsoft.com/office/drawing/2014/main" id="{1E9A1312-FEFA-4578-AFDB-4A8071FF3590}"/>
                 </a:ext>
               </a:extLst>
             </p:cNvPr>
@@ -3950,10 +3992,10 @@
         </p:sp>
         <p:pic>
           <p:nvPicPr>
-            <p:cNvPr id="59" name="Picture 10" descr="Bildergebnis fÃ¼r raspberry">
+            <p:cNvPr id="102" name="Picture 10" descr="Bildergebnis fÃ¼r raspberry">
               <a:extLst>
                 <a:ext uri="{FF2B5EF4-FFF2-40B4-BE49-F238E27FC236}">
-                  <a16:creationId xmlns:a16="http://schemas.microsoft.com/office/drawing/2014/main" id="{649237C9-540C-43CD-8152-EDD2E147A396}"/>
+                  <a16:creationId xmlns:a16="http://schemas.microsoft.com/office/drawing/2014/main" id="{8D845995-F019-49FD-8743-724273DA1980}"/>
                 </a:ext>
               </a:extLst>
             </p:cNvPr>
@@ -4005,10 +4047,10 @@
       </p:grpSp>
       <p:grpSp>
         <p:nvGrpSpPr>
-          <p:cNvPr id="60" name="Group 59">
+          <p:cNvPr id="103" name="Group 102">
             <a:extLst>
               <a:ext uri="{FF2B5EF4-FFF2-40B4-BE49-F238E27FC236}">
-                <a16:creationId xmlns:a16="http://schemas.microsoft.com/office/drawing/2014/main" id="{06CB3373-CE7D-4199-BC35-DD30923A87E8}"/>
+                <a16:creationId xmlns:a16="http://schemas.microsoft.com/office/drawing/2014/main" id="{85AEDD02-0A11-44BC-8075-319D28E82808}"/>
               </a:ext>
             </a:extLst>
           </p:cNvPr>
@@ -4017,7 +4059,7 @@
         </p:nvGrpSpPr>
         <p:grpSpPr>
           <a:xfrm>
-            <a:off x="613539" y="2258887"/>
+            <a:off x="1033523" y="2296100"/>
             <a:ext cx="1665111" cy="352658"/>
             <a:chOff x="5825290" y="3473753"/>
             <a:chExt cx="1665111" cy="352658"/>
@@ -4025,10 +4067,10 @@
         </p:grpSpPr>
         <p:sp>
           <p:nvSpPr>
-            <p:cNvPr id="61" name="Rectangle: Rounded Corners 60">
+            <p:cNvPr id="106" name="Rectangle: Rounded Corners 105">
               <a:extLst>
                 <a:ext uri="{FF2B5EF4-FFF2-40B4-BE49-F238E27FC236}">
-                  <a16:creationId xmlns:a16="http://schemas.microsoft.com/office/drawing/2014/main" id="{F6567F9E-7314-49FF-8035-3D797D6A87B9}"/>
+                  <a16:creationId xmlns:a16="http://schemas.microsoft.com/office/drawing/2014/main" id="{7728964C-32A7-45D5-A6AB-B8BADEB58FBB}"/>
                 </a:ext>
               </a:extLst>
             </p:cNvPr>
@@ -4077,10 +4119,10 @@
         </p:sp>
         <p:pic>
           <p:nvPicPr>
-            <p:cNvPr id="62" name="Picture 8" descr="Ãhnliches Foto">
+            <p:cNvPr id="107" name="Picture 8" descr="Ãhnliches Foto">
               <a:extLst>
                 <a:ext uri="{FF2B5EF4-FFF2-40B4-BE49-F238E27FC236}">
-                  <a16:creationId xmlns:a16="http://schemas.microsoft.com/office/drawing/2014/main" id="{16616460-3C40-4F74-99EF-07913A8A89B1}"/>
+                  <a16:creationId xmlns:a16="http://schemas.microsoft.com/office/drawing/2014/main" id="{0880C636-612F-4F77-BE18-CE9649EE3B9B}"/>
                 </a:ext>
               </a:extLst>
             </p:cNvPr>
@@ -4123,10 +4165,10 @@
       </p:grpSp>
       <p:cxnSp>
         <p:nvCxnSpPr>
-          <p:cNvPr id="66" name="Straight Arrow Connector 65">
+          <p:cNvPr id="109" name="Straight Arrow Connector 108">
             <a:extLst>
               <a:ext uri="{FF2B5EF4-FFF2-40B4-BE49-F238E27FC236}">
-                <a16:creationId xmlns:a16="http://schemas.microsoft.com/office/drawing/2014/main" id="{8D7FC86E-2530-4F29-911B-C71A721F314D}"/>
+                <a16:creationId xmlns:a16="http://schemas.microsoft.com/office/drawing/2014/main" id="{C1E83E76-62DA-4319-B484-F4182282FD50}"/>
               </a:ext>
             </a:extLst>
           </p:cNvPr>
@@ -4137,7 +4179,7 @@
         </p:nvCxnSpPr>
         <p:spPr>
           <a:xfrm flipV="1">
-            <a:off x="937761" y="1365290"/>
+            <a:off x="1357745" y="1402503"/>
             <a:ext cx="3741" cy="893597"/>
           </a:xfrm>
           <a:prstGeom prst="straightConnector1">
@@ -4172,10 +4214,10 @@
       </p:cxnSp>
       <p:sp>
         <p:nvSpPr>
-          <p:cNvPr id="73" name="Rectangle: Rounded Corners 72">
+          <p:cNvPr id="114" name="Rectangle: Rounded Corners 113">
             <a:extLst>
               <a:ext uri="{FF2B5EF4-FFF2-40B4-BE49-F238E27FC236}">
-                <a16:creationId xmlns:a16="http://schemas.microsoft.com/office/drawing/2014/main" id="{9E1ED5D8-485F-4E28-A9DD-F7CF1204692B}"/>
+                <a16:creationId xmlns:a16="http://schemas.microsoft.com/office/drawing/2014/main" id="{5EB83EF7-DFC8-4162-B0FA-FF468EF860BF}"/>
               </a:ext>
             </a:extLst>
           </p:cNvPr>
@@ -4184,7 +4226,7 @@
         </p:nvSpPr>
         <p:spPr>
           <a:xfrm>
-            <a:off x="7657882" y="2597728"/>
+            <a:off x="7246761" y="2416969"/>
             <a:ext cx="967496" cy="361951"/>
           </a:xfrm>
           <a:prstGeom prst="roundRect">
@@ -4227,23 +4269,23 @@
       </p:sp>
       <p:cxnSp>
         <p:nvCxnSpPr>
-          <p:cNvPr id="74" name="Straight Arrow Connector 73">
+          <p:cNvPr id="119" name="Straight Arrow Connector 118">
             <a:extLst>
               <a:ext uri="{FF2B5EF4-FFF2-40B4-BE49-F238E27FC236}">
-                <a16:creationId xmlns:a16="http://schemas.microsoft.com/office/drawing/2014/main" id="{6C3D0001-77AF-4707-90EE-81AC27E86CB5}"/>
+                <a16:creationId xmlns:a16="http://schemas.microsoft.com/office/drawing/2014/main" id="{4CFB541C-D94B-4750-BBBD-9ADFD92F42C1}"/>
               </a:ext>
             </a:extLst>
           </p:cNvPr>
           <p:cNvCxnSpPr>
             <a:cxnSpLocks/>
-            <a:stCxn id="73" idx="2"/>
-            <a:endCxn id="104" idx="0"/>
+            <a:stCxn id="114" idx="2"/>
+            <a:endCxn id="138" idx="0"/>
           </p:cNvCxnSpPr>
           <p:nvPr/>
         </p:nvCxnSpPr>
         <p:spPr>
           <a:xfrm flipH="1">
-            <a:off x="8141629" y="2959679"/>
+            <a:off x="7730508" y="2778920"/>
             <a:ext cx="1" cy="718451"/>
           </a:xfrm>
           <a:prstGeom prst="straightConnector1">
@@ -4278,10 +4320,10 @@
       </p:cxnSp>
       <p:sp>
         <p:nvSpPr>
-          <p:cNvPr id="77" name="Rectangle: Rounded Corners 76">
+          <p:cNvPr id="121" name="Rectangle: Rounded Corners 120">
             <a:extLst>
               <a:ext uri="{FF2B5EF4-FFF2-40B4-BE49-F238E27FC236}">
-                <a16:creationId xmlns:a16="http://schemas.microsoft.com/office/drawing/2014/main" id="{4A666412-9733-412A-A282-9862CAC8FDC2}"/>
+                <a16:creationId xmlns:a16="http://schemas.microsoft.com/office/drawing/2014/main" id="{C2A8C56D-4FFA-4188-9335-A8624568D5B5}"/>
               </a:ext>
             </a:extLst>
           </p:cNvPr>
@@ -4290,7 +4332,7 @@
         </p:nvSpPr>
         <p:spPr>
           <a:xfrm>
-            <a:off x="7303720" y="5965949"/>
+            <a:off x="6898669" y="5754160"/>
             <a:ext cx="1665111" cy="819351"/>
           </a:xfrm>
           <a:prstGeom prst="roundRect">
@@ -4354,24 +4396,24 @@
       </p:sp>
       <p:cxnSp>
         <p:nvCxnSpPr>
-          <p:cNvPr id="79" name="Straight Arrow Connector 78">
+          <p:cNvPr id="122" name="Straight Arrow Connector 121">
             <a:extLst>
               <a:ext uri="{FF2B5EF4-FFF2-40B4-BE49-F238E27FC236}">
-                <a16:creationId xmlns:a16="http://schemas.microsoft.com/office/drawing/2014/main" id="{89A4BA02-4219-421A-BBB1-79A4FFCBA116}"/>
+                <a16:creationId xmlns:a16="http://schemas.microsoft.com/office/drawing/2014/main" id="{76E64D41-D633-4D30-AA7D-3931518F7155}"/>
               </a:ext>
             </a:extLst>
           </p:cNvPr>
           <p:cNvCxnSpPr>
             <a:cxnSpLocks/>
-            <a:stCxn id="77" idx="0"/>
-            <a:endCxn id="80" idx="2"/>
+            <a:stCxn id="121" idx="0"/>
+            <a:endCxn id="123" idx="2"/>
           </p:cNvCxnSpPr>
           <p:nvPr/>
         </p:nvCxnSpPr>
         <p:spPr>
           <a:xfrm flipH="1" flipV="1">
-            <a:off x="8136275" y="5182778"/>
-            <a:ext cx="1" cy="783171"/>
+            <a:off x="7725154" y="5002019"/>
+            <a:ext cx="6071" cy="752141"/>
           </a:xfrm>
           <a:prstGeom prst="straightConnector1">
             <a:avLst/>
@@ -4405,10 +4447,10 @@
       </p:cxnSp>
       <p:sp>
         <p:nvSpPr>
-          <p:cNvPr id="80" name="Rectangle: Rounded Corners 79">
+          <p:cNvPr id="123" name="Rectangle: Rounded Corners 122">
             <a:extLst>
               <a:ext uri="{FF2B5EF4-FFF2-40B4-BE49-F238E27FC236}">
-                <a16:creationId xmlns:a16="http://schemas.microsoft.com/office/drawing/2014/main" id="{E58DBE07-C8A6-4244-BF0C-E466AB5ABACB}"/>
+                <a16:creationId xmlns:a16="http://schemas.microsoft.com/office/drawing/2014/main" id="{7BD3FCB5-AF3A-4BE3-AF9A-A1B8DFDAF4A4}"/>
               </a:ext>
             </a:extLst>
           </p:cNvPr>
@@ -4417,7 +4459,7 @@
         </p:nvSpPr>
         <p:spPr>
           <a:xfrm>
-            <a:off x="7648248" y="4820827"/>
+            <a:off x="7237127" y="4640068"/>
             <a:ext cx="976054" cy="361951"/>
           </a:xfrm>
           <a:prstGeom prst="roundRect">
@@ -4460,10 +4502,10 @@
       </p:sp>
       <p:sp>
         <p:nvSpPr>
-          <p:cNvPr id="81" name="Rectangle: Rounded Corners 80">
+          <p:cNvPr id="124" name="Rectangle: Rounded Corners 123">
             <a:extLst>
               <a:ext uri="{FF2B5EF4-FFF2-40B4-BE49-F238E27FC236}">
-                <a16:creationId xmlns:a16="http://schemas.microsoft.com/office/drawing/2014/main" id="{F1C62CB5-96CC-4538-A179-CAAE2E9AA0FE}"/>
+                <a16:creationId xmlns:a16="http://schemas.microsoft.com/office/drawing/2014/main" id="{E9EDFEDC-0C20-42A3-90FA-3DF7CD138040}"/>
               </a:ext>
             </a:extLst>
           </p:cNvPr>
@@ -4472,7 +4514,7 @@
         </p:nvSpPr>
         <p:spPr>
           <a:xfrm>
-            <a:off x="5308430" y="4809339"/>
+            <a:off x="4897309" y="4628580"/>
             <a:ext cx="976054" cy="361951"/>
           </a:xfrm>
           <a:prstGeom prst="roundRect">
@@ -4515,10 +4557,10 @@
       </p:sp>
       <p:grpSp>
         <p:nvGrpSpPr>
-          <p:cNvPr id="17" name="Group 16">
+          <p:cNvPr id="125" name="Group 124">
             <a:extLst>
               <a:ext uri="{FF2B5EF4-FFF2-40B4-BE49-F238E27FC236}">
-                <a16:creationId xmlns:a16="http://schemas.microsoft.com/office/drawing/2014/main" id="{E84718E3-163F-4F6F-9E28-6A65F9545F92}"/>
+                <a16:creationId xmlns:a16="http://schemas.microsoft.com/office/drawing/2014/main" id="{D672A4F2-DEAE-4D8A-B192-512AB0E0C386}"/>
               </a:ext>
             </a:extLst>
           </p:cNvPr>
@@ -4527,7 +4569,7 @@
         </p:nvGrpSpPr>
         <p:grpSpPr>
           <a:xfrm>
-            <a:off x="816740" y="4802734"/>
+            <a:off x="405619" y="4621975"/>
             <a:ext cx="2817908" cy="361951"/>
             <a:chOff x="1692664" y="4993850"/>
             <a:chExt cx="2817908" cy="361951"/>
@@ -4535,10 +4577,10 @@
         </p:grpSpPr>
         <p:pic>
           <p:nvPicPr>
-            <p:cNvPr id="75" name="Picture 16" descr="https://www.modelleisenbahn-cms.de/images/product_images/popup_images/83331.jpg">
+            <p:cNvPr id="126" name="Picture 16" descr="https://www.modelleisenbahn-cms.de/images/product_images/popup_images/83331.jpg">
               <a:extLst>
                 <a:ext uri="{FF2B5EF4-FFF2-40B4-BE49-F238E27FC236}">
-                  <a16:creationId xmlns:a16="http://schemas.microsoft.com/office/drawing/2014/main" id="{0BA49E9C-1988-46A8-B57B-9D8B7AD8D90B}"/>
+                  <a16:creationId xmlns:a16="http://schemas.microsoft.com/office/drawing/2014/main" id="{256C5BD8-DA6E-482C-A83D-3451C48A1FE9}"/>
                 </a:ext>
               </a:extLst>
             </p:cNvPr>
@@ -4580,10 +4622,10 @@
         </p:pic>
         <p:sp>
           <p:nvSpPr>
-            <p:cNvPr id="76" name="Rectangle: Rounded Corners 75">
+            <p:cNvPr id="127" name="Rectangle: Rounded Corners 126">
               <a:extLst>
                 <a:ext uri="{FF2B5EF4-FFF2-40B4-BE49-F238E27FC236}">
-                  <a16:creationId xmlns:a16="http://schemas.microsoft.com/office/drawing/2014/main" id="{AF43DC8C-5155-486B-A7D0-68F4178188B6}"/>
+                  <a16:creationId xmlns:a16="http://schemas.microsoft.com/office/drawing/2014/main" id="{0C403EBF-307A-4F46-9891-9A95EF636922}"/>
                 </a:ext>
               </a:extLst>
             </p:cNvPr>
@@ -4632,10 +4674,10 @@
         </p:sp>
         <p:sp>
           <p:nvSpPr>
-            <p:cNvPr id="82" name="Rectangle: Rounded Corners 81">
+            <p:cNvPr id="128" name="Rectangle: Rounded Corners 127">
               <a:extLst>
                 <a:ext uri="{FF2B5EF4-FFF2-40B4-BE49-F238E27FC236}">
-                  <a16:creationId xmlns:a16="http://schemas.microsoft.com/office/drawing/2014/main" id="{5BC112BE-01A1-47E8-AD9D-ACC6B275E345}"/>
+                  <a16:creationId xmlns:a16="http://schemas.microsoft.com/office/drawing/2014/main" id="{06B1D4A9-17EE-4D0C-9D94-B7C38E1FBC22}"/>
                 </a:ext>
               </a:extLst>
             </p:cNvPr>
@@ -4692,23 +4734,23 @@
       </p:grpSp>
       <p:cxnSp>
         <p:nvCxnSpPr>
-          <p:cNvPr id="83" name="Straight Arrow Connector 82">
+          <p:cNvPr id="129" name="Straight Arrow Connector 128">
             <a:extLst>
               <a:ext uri="{FF2B5EF4-FFF2-40B4-BE49-F238E27FC236}">
-                <a16:creationId xmlns:a16="http://schemas.microsoft.com/office/drawing/2014/main" id="{A3832664-631A-4C7B-A8F5-3E369A757E56}"/>
+                <a16:creationId xmlns:a16="http://schemas.microsoft.com/office/drawing/2014/main" id="{BBE2CE23-0012-4B48-9992-F385CDD290F9}"/>
               </a:ext>
             </a:extLst>
           </p:cNvPr>
           <p:cNvCxnSpPr>
             <a:cxnSpLocks/>
-            <a:stCxn id="81" idx="1"/>
-            <a:endCxn id="82" idx="3"/>
+            <a:stCxn id="124" idx="1"/>
+            <a:endCxn id="128" idx="3"/>
           </p:cNvCxnSpPr>
           <p:nvPr/>
         </p:nvCxnSpPr>
         <p:spPr>
           <a:xfrm flipH="1" flipV="1">
-            <a:off x="3634648" y="4983710"/>
+            <a:off x="3223527" y="4802951"/>
             <a:ext cx="1673782" cy="6605"/>
           </a:xfrm>
           <a:prstGeom prst="straightConnector1">
@@ -4743,10 +4785,10 @@
       </p:cxnSp>
       <p:sp>
         <p:nvSpPr>
-          <p:cNvPr id="84" name="Rectangle: Rounded Corners 83">
+          <p:cNvPr id="130" name="Rectangle: Rounded Corners 129">
             <a:extLst>
               <a:ext uri="{FF2B5EF4-FFF2-40B4-BE49-F238E27FC236}">
-                <a16:creationId xmlns:a16="http://schemas.microsoft.com/office/drawing/2014/main" id="{CD92A25B-4E89-4581-B19B-A8288DE39BB6}"/>
+                <a16:creationId xmlns:a16="http://schemas.microsoft.com/office/drawing/2014/main" id="{F1C3F466-6D7D-43CE-A553-D89A46653D36}"/>
               </a:ext>
             </a:extLst>
           </p:cNvPr>
@@ -4755,7 +4797,7 @@
         </p:nvSpPr>
         <p:spPr>
           <a:xfrm>
-            <a:off x="5308430" y="3675679"/>
+            <a:off x="4897309" y="3494920"/>
             <a:ext cx="976054" cy="361951"/>
           </a:xfrm>
           <a:prstGeom prst="roundRect">
@@ -4798,23 +4840,23 @@
       </p:sp>
       <p:cxnSp>
         <p:nvCxnSpPr>
-          <p:cNvPr id="85" name="Connector: Elbow 84">
+          <p:cNvPr id="131" name="Connector: Elbow 130">
             <a:extLst>
               <a:ext uri="{FF2B5EF4-FFF2-40B4-BE49-F238E27FC236}">
-                <a16:creationId xmlns:a16="http://schemas.microsoft.com/office/drawing/2014/main" id="{FE5684D9-89E8-483D-821C-DE830FCC1D2D}"/>
+                <a16:creationId xmlns:a16="http://schemas.microsoft.com/office/drawing/2014/main" id="{2FD1A48E-5687-41D0-965E-375B27D41E5B}"/>
               </a:ext>
             </a:extLst>
           </p:cNvPr>
           <p:cNvCxnSpPr>
             <a:cxnSpLocks/>
-            <a:stCxn id="104" idx="1"/>
-            <a:endCxn id="84" idx="3"/>
+            <a:stCxn id="138" idx="1"/>
+            <a:endCxn id="130" idx="3"/>
           </p:cNvCxnSpPr>
           <p:nvPr/>
         </p:nvCxnSpPr>
         <p:spPr>
           <a:xfrm rot="10800000">
-            <a:off x="6284485" y="3856656"/>
+            <a:off x="5873364" y="3675897"/>
             <a:ext cx="1373397" cy="2451"/>
           </a:xfrm>
           <a:prstGeom prst="bentConnector3">
@@ -4851,23 +4893,23 @@
       </p:cxnSp>
       <p:cxnSp>
         <p:nvCxnSpPr>
-          <p:cNvPr id="86" name="Straight Arrow Connector 85">
+          <p:cNvPr id="132" name="Straight Arrow Connector 131">
             <a:extLst>
               <a:ext uri="{FF2B5EF4-FFF2-40B4-BE49-F238E27FC236}">
-                <a16:creationId xmlns:a16="http://schemas.microsoft.com/office/drawing/2014/main" id="{3ED29071-EBDC-4048-B7F9-149073B0B221}"/>
+                <a16:creationId xmlns:a16="http://schemas.microsoft.com/office/drawing/2014/main" id="{870D367E-9738-4F3B-B52E-5D5A27EEBB4F}"/>
               </a:ext>
             </a:extLst>
           </p:cNvPr>
           <p:cNvCxnSpPr>
             <a:cxnSpLocks/>
-            <a:stCxn id="84" idx="2"/>
-            <a:endCxn id="81" idx="0"/>
+            <a:stCxn id="130" idx="2"/>
+            <a:endCxn id="124" idx="0"/>
           </p:cNvCxnSpPr>
           <p:nvPr/>
         </p:nvCxnSpPr>
         <p:spPr>
           <a:xfrm>
-            <a:off x="5796457" y="4037630"/>
+            <a:off x="5385336" y="3856871"/>
             <a:ext cx="0" cy="771709"/>
           </a:xfrm>
           <a:prstGeom prst="straightConnector1">
@@ -4902,10 +4944,10 @@
       </p:cxnSp>
       <p:pic>
         <p:nvPicPr>
-          <p:cNvPr id="87" name="Picture 8" descr="Ãhnliches Foto">
+          <p:cNvPr id="133" name="Picture 8" descr="Ãhnliches Foto">
             <a:extLst>
               <a:ext uri="{FF2B5EF4-FFF2-40B4-BE49-F238E27FC236}">
-                <a16:creationId xmlns:a16="http://schemas.microsoft.com/office/drawing/2014/main" id="{0C2FF19B-1D49-4257-A203-FD2364AE8733}"/>
+                <a16:creationId xmlns:a16="http://schemas.microsoft.com/office/drawing/2014/main" id="{47A97BFA-A324-459E-9690-EF4D53461ABB}"/>
               </a:ext>
             </a:extLst>
           </p:cNvPr>
@@ -4927,7 +4969,7 @@
         </p:blipFill>
         <p:spPr bwMode="auto">
           <a:xfrm>
-            <a:off x="7403543" y="6429736"/>
+            <a:off x="6992422" y="6248977"/>
             <a:ext cx="1465462" cy="261258"/>
           </a:xfrm>
           <a:prstGeom prst="rect">
@@ -4947,10 +4989,10 @@
       </p:pic>
       <p:grpSp>
         <p:nvGrpSpPr>
-          <p:cNvPr id="94" name="Group 93">
+          <p:cNvPr id="134" name="Group 133">
             <a:extLst>
               <a:ext uri="{FF2B5EF4-FFF2-40B4-BE49-F238E27FC236}">
-                <a16:creationId xmlns:a16="http://schemas.microsoft.com/office/drawing/2014/main" id="{BFE513B8-133E-41F4-BB95-E2FA4202292F}"/>
+                <a16:creationId xmlns:a16="http://schemas.microsoft.com/office/drawing/2014/main" id="{AF3C77B0-765B-42F6-9F48-0BAEC50140D9}"/>
               </a:ext>
             </a:extLst>
           </p:cNvPr>
@@ -4959,7 +5001,7 @@
         </p:nvGrpSpPr>
         <p:grpSpPr>
           <a:xfrm>
-            <a:off x="2371398" y="3503266"/>
+            <a:off x="1960277" y="3322507"/>
             <a:ext cx="1258360" cy="698018"/>
             <a:chOff x="3489595" y="3906884"/>
             <a:chExt cx="1258360" cy="698018"/>
@@ -4967,10 +5009,10 @@
         </p:grpSpPr>
         <p:sp>
           <p:nvSpPr>
-            <p:cNvPr id="95" name="Rectangle: Rounded Corners 94">
+            <p:cNvPr id="135" name="Rectangle: Rounded Corners 134">
               <a:extLst>
                 <a:ext uri="{FF2B5EF4-FFF2-40B4-BE49-F238E27FC236}">
-                  <a16:creationId xmlns:a16="http://schemas.microsoft.com/office/drawing/2014/main" id="{5B9056A4-E75A-4255-80CA-93B1C817AA87}"/>
+                  <a16:creationId xmlns:a16="http://schemas.microsoft.com/office/drawing/2014/main" id="{E434A413-DF29-4C31-816D-AA8D3C5D20B9}"/>
                 </a:ext>
               </a:extLst>
             </p:cNvPr>
@@ -5029,10 +5071,10 @@
         </p:sp>
         <p:pic>
           <p:nvPicPr>
-            <p:cNvPr id="96" name="Picture 2" descr="Bildergebnis fÃ¼r strom">
+            <p:cNvPr id="136" name="Picture 2" descr="Bildergebnis fÃ¼r strom">
               <a:extLst>
                 <a:ext uri="{FF2B5EF4-FFF2-40B4-BE49-F238E27FC236}">
-                  <a16:creationId xmlns:a16="http://schemas.microsoft.com/office/drawing/2014/main" id="{B328B639-C9DD-4986-A6AC-34D20F17544F}"/>
+                  <a16:creationId xmlns:a16="http://schemas.microsoft.com/office/drawing/2014/main" id="{D4EE5229-62BF-4BCF-B46F-7715CC14E2B0}"/>
                 </a:ext>
               </a:extLst>
             </p:cNvPr>
@@ -5077,23 +5119,23 @@
       </p:grpSp>
       <p:cxnSp>
         <p:nvCxnSpPr>
-          <p:cNvPr id="97" name="Straight Arrow Connector 96">
+          <p:cNvPr id="137" name="Straight Arrow Connector 136">
             <a:extLst>
               <a:ext uri="{FF2B5EF4-FFF2-40B4-BE49-F238E27FC236}">
-                <a16:creationId xmlns:a16="http://schemas.microsoft.com/office/drawing/2014/main" id="{0D933AAB-5A75-4654-B27E-E9774EAB54FA}"/>
+                <a16:creationId xmlns:a16="http://schemas.microsoft.com/office/drawing/2014/main" id="{E141AD12-114E-4425-9DC1-E6B8B002F6FB}"/>
               </a:ext>
             </a:extLst>
           </p:cNvPr>
           <p:cNvCxnSpPr>
             <a:cxnSpLocks/>
-            <a:stCxn id="84" idx="1"/>
-            <a:endCxn id="95" idx="3"/>
+            <a:stCxn id="130" idx="1"/>
+            <a:endCxn id="135" idx="3"/>
           </p:cNvCxnSpPr>
           <p:nvPr/>
         </p:nvCxnSpPr>
         <p:spPr>
           <a:xfrm flipH="1" flipV="1">
-            <a:off x="3629758" y="3852275"/>
+            <a:off x="3218637" y="3671516"/>
             <a:ext cx="1678672" cy="4380"/>
           </a:xfrm>
           <a:prstGeom prst="straightConnector1">
@@ -5128,10 +5170,10 @@
       </p:cxnSp>
       <p:sp>
         <p:nvSpPr>
-          <p:cNvPr id="104" name="Rectangle: Rounded Corners 103">
+          <p:cNvPr id="138" name="Rectangle: Rounded Corners 137">
             <a:extLst>
               <a:ext uri="{FF2B5EF4-FFF2-40B4-BE49-F238E27FC236}">
-                <a16:creationId xmlns:a16="http://schemas.microsoft.com/office/drawing/2014/main" id="{5105A4F6-35BC-4718-8284-611F506119BC}"/>
+                <a16:creationId xmlns:a16="http://schemas.microsoft.com/office/drawing/2014/main" id="{69097934-CE00-481A-BC5B-53311E95203D}"/>
               </a:ext>
             </a:extLst>
           </p:cNvPr>
@@ -5140,7 +5182,7 @@
         </p:nvSpPr>
         <p:spPr>
           <a:xfrm>
-            <a:off x="7657881" y="3678130"/>
+            <a:off x="7246760" y="3497371"/>
             <a:ext cx="967496" cy="361951"/>
           </a:xfrm>
           <a:prstGeom prst="roundRect">
@@ -5183,23 +5225,23 @@
       </p:sp>
       <p:cxnSp>
         <p:nvCxnSpPr>
-          <p:cNvPr id="105" name="Straight Arrow Connector 104">
+          <p:cNvPr id="139" name="Straight Arrow Connector 138">
             <a:extLst>
               <a:ext uri="{FF2B5EF4-FFF2-40B4-BE49-F238E27FC236}">
-                <a16:creationId xmlns:a16="http://schemas.microsoft.com/office/drawing/2014/main" id="{71DF6B8B-8CFA-4ECA-BBA7-A3EC6436C605}"/>
+                <a16:creationId xmlns:a16="http://schemas.microsoft.com/office/drawing/2014/main" id="{F0F58D4F-6505-485B-A8FC-32F9D779BCFD}"/>
               </a:ext>
             </a:extLst>
           </p:cNvPr>
           <p:cNvCxnSpPr>
             <a:cxnSpLocks/>
-            <a:stCxn id="104" idx="2"/>
-            <a:endCxn id="80" idx="0"/>
+            <a:stCxn id="138" idx="2"/>
+            <a:endCxn id="123" idx="0"/>
           </p:cNvCxnSpPr>
           <p:nvPr/>
         </p:nvCxnSpPr>
         <p:spPr>
           <a:xfrm flipH="1">
-            <a:off x="8136275" y="4040081"/>
+            <a:off x="7725154" y="3859322"/>
             <a:ext cx="5354" cy="780746"/>
           </a:xfrm>
           <a:prstGeom prst="straightConnector1">
@@ -5234,23 +5276,23 @@
       </p:cxnSp>
       <p:cxnSp>
         <p:nvCxnSpPr>
-          <p:cNvPr id="5" name="Connector: Elbow 4">
+          <p:cNvPr id="140" name="Connector: Elbow 139">
             <a:extLst>
               <a:ext uri="{FF2B5EF4-FFF2-40B4-BE49-F238E27FC236}">
-                <a16:creationId xmlns:a16="http://schemas.microsoft.com/office/drawing/2014/main" id="{A8291DCA-1256-4E8A-8B05-E1236EACA69E}"/>
+                <a16:creationId xmlns:a16="http://schemas.microsoft.com/office/drawing/2014/main" id="{8928B1E9-8B32-4603-ACF0-B0C6802F7714}"/>
               </a:ext>
             </a:extLst>
           </p:cNvPr>
           <p:cNvCxnSpPr>
             <a:cxnSpLocks/>
-            <a:stCxn id="56" idx="2"/>
-            <a:endCxn id="108" idx="1"/>
+            <a:stCxn id="99" idx="2"/>
+            <a:endCxn id="141" idx="1"/>
           </p:cNvCxnSpPr>
           <p:nvPr/>
         </p:nvCxnSpPr>
         <p:spPr>
           <a:xfrm rot="16200000" flipH="1">
-            <a:off x="1339749" y="432637"/>
+            <a:off x="1759733" y="469850"/>
             <a:ext cx="532538" cy="1332770"/>
           </a:xfrm>
           <a:prstGeom prst="bentConnector2">
@@ -5282,10 +5324,10 @@
       </p:cxnSp>
       <p:sp>
         <p:nvSpPr>
-          <p:cNvPr id="108" name="Rectangle: Rounded Corners 107">
+          <p:cNvPr id="141" name="Rectangle: Rounded Corners 140">
             <a:extLst>
               <a:ext uri="{FF2B5EF4-FFF2-40B4-BE49-F238E27FC236}">
-                <a16:creationId xmlns:a16="http://schemas.microsoft.com/office/drawing/2014/main" id="{4C75C33D-FF60-4454-8310-DBD390E72004}"/>
+                <a16:creationId xmlns:a16="http://schemas.microsoft.com/office/drawing/2014/main" id="{88EF1495-F331-4AC5-9957-887F84E1FCBD}"/>
               </a:ext>
             </a:extLst>
           </p:cNvPr>
@@ -5294,7 +5336,7 @@
         </p:nvSpPr>
         <p:spPr>
           <a:xfrm>
-            <a:off x="2272403" y="1147466"/>
+            <a:off x="2692387" y="1184679"/>
             <a:ext cx="1790513" cy="435649"/>
           </a:xfrm>
           <a:prstGeom prst="roundRect">
@@ -5371,10 +5413,10 @@
       </p:sp>
       <p:cxnSp>
         <p:nvCxnSpPr>
-          <p:cNvPr id="110" name="Straight Arrow Connector 109">
+          <p:cNvPr id="142" name="Straight Arrow Connector 141">
             <a:extLst>
               <a:ext uri="{FF2B5EF4-FFF2-40B4-BE49-F238E27FC236}">
-                <a16:creationId xmlns:a16="http://schemas.microsoft.com/office/drawing/2014/main" id="{704B95C1-C986-4B91-AEA6-4537C7B4D834}"/>
+                <a16:creationId xmlns:a16="http://schemas.microsoft.com/office/drawing/2014/main" id="{8D7EB32F-7785-4437-8B06-A51B1FD2E23F}"/>
               </a:ext>
             </a:extLst>
           </p:cNvPr>
@@ -5385,7 +5427,7 @@
         </p:nvCxnSpPr>
         <p:spPr>
           <a:xfrm flipV="1">
-            <a:off x="1876642" y="1365290"/>
+            <a:off x="2296626" y="1402503"/>
             <a:ext cx="3741" cy="893597"/>
           </a:xfrm>
           <a:prstGeom prst="straightConnector1">
@@ -5420,10 +5462,10 @@
       </p:cxnSp>
       <p:sp>
         <p:nvSpPr>
-          <p:cNvPr id="111" name="Rectangle: Rounded Corners 110">
+          <p:cNvPr id="143" name="Rectangle: Rounded Corners 142">
             <a:extLst>
               <a:ext uri="{FF2B5EF4-FFF2-40B4-BE49-F238E27FC236}">
-                <a16:creationId xmlns:a16="http://schemas.microsoft.com/office/drawing/2014/main" id="{17D9A2D0-9BE2-42DE-8FFB-78CC7DB0B9B6}"/>
+                <a16:creationId xmlns:a16="http://schemas.microsoft.com/office/drawing/2014/main" id="{4168583B-4AF3-400A-AE80-3AFFB59D20C9}"/>
               </a:ext>
             </a:extLst>
           </p:cNvPr>
@@ -5432,8 +5474,8 @@
         </p:nvSpPr>
         <p:spPr>
           <a:xfrm>
-            <a:off x="489635" y="1563734"/>
-            <a:ext cx="835184" cy="435649"/>
+            <a:off x="756063" y="1531377"/>
+            <a:ext cx="1142296" cy="574790"/>
           </a:xfrm>
           <a:prstGeom prst="roundRect">
             <a:avLst/>
@@ -5488,6 +5530,28 @@
                   </a:schemeClr>
                 </a:solidFill>
               </a:rPr>
+              <a:t>2 </a:t>
+            </a:r>
+            <a:r>
+              <a:rPr lang="de-DE" sz="1200" dirty="0">
+                <a:solidFill>
+                  <a:schemeClr val="tx1">
+                    <a:lumMod val="65000"/>
+                    <a:lumOff val="35000"/>
+                  </a:schemeClr>
+                </a:solidFill>
+              </a:rPr>
+              <a:t>oder 0,75mm</a:t>
+            </a:r>
+            <a:r>
+              <a:rPr lang="de-DE" sz="1200" baseline="30000" dirty="0">
+                <a:solidFill>
+                  <a:schemeClr val="tx1">
+                    <a:lumMod val="65000"/>
+                    <a:lumOff val="35000"/>
+                  </a:schemeClr>
+                </a:solidFill>
+              </a:rPr>
               <a:t>2</a:t>
             </a:r>
           </a:p>
@@ -5509,10 +5573,10 @@
       </p:sp>
       <p:sp>
         <p:nvSpPr>
-          <p:cNvPr id="112" name="Rectangle: Rounded Corners 111">
+          <p:cNvPr id="144" name="Rectangle: Rounded Corners 143">
             <a:extLst>
               <a:ext uri="{FF2B5EF4-FFF2-40B4-BE49-F238E27FC236}">
-                <a16:creationId xmlns:a16="http://schemas.microsoft.com/office/drawing/2014/main" id="{3C39678E-9F38-413F-810A-85F9D2835B6D}"/>
+                <a16:creationId xmlns:a16="http://schemas.microsoft.com/office/drawing/2014/main" id="{58E1998D-FF5E-4467-ABFC-E6471A9601DE}"/>
               </a:ext>
             </a:extLst>
           </p:cNvPr>
@@ -5521,7 +5585,7 @@
         </p:nvSpPr>
         <p:spPr>
           <a:xfrm>
-            <a:off x="7695895" y="5341625"/>
+            <a:off x="7284774" y="5160866"/>
             <a:ext cx="880758" cy="435649"/>
           </a:xfrm>
           <a:prstGeom prst="roundRect">
@@ -5598,10 +5662,10 @@
       </p:sp>
       <p:sp>
         <p:nvSpPr>
-          <p:cNvPr id="113" name="Rectangle: Rounded Corners 112">
+          <p:cNvPr id="145" name="Rectangle: Rounded Corners 144">
             <a:extLst>
               <a:ext uri="{FF2B5EF4-FFF2-40B4-BE49-F238E27FC236}">
-                <a16:creationId xmlns:a16="http://schemas.microsoft.com/office/drawing/2014/main" id="{B90FA1EF-54DA-41F4-9C47-BF6AE5F3AC9F}"/>
+                <a16:creationId xmlns:a16="http://schemas.microsoft.com/office/drawing/2014/main" id="{BCE5860D-C6B1-4881-A270-CA3F68D1E816}"/>
               </a:ext>
             </a:extLst>
           </p:cNvPr>
@@ -5610,7 +5674,7 @@
         </p:nvSpPr>
         <p:spPr>
           <a:xfrm>
-            <a:off x="5211182" y="4201262"/>
+            <a:off x="4800061" y="4020503"/>
             <a:ext cx="1201186" cy="435649"/>
           </a:xfrm>
           <a:prstGeom prst="roundRect">
@@ -5681,10 +5745,10 @@
       </p:sp>
       <p:sp>
         <p:nvSpPr>
-          <p:cNvPr id="115" name="Rectangle: Rounded Corners 114">
+          <p:cNvPr id="146" name="Rectangle: Rounded Corners 145">
             <a:extLst>
               <a:ext uri="{FF2B5EF4-FFF2-40B4-BE49-F238E27FC236}">
-                <a16:creationId xmlns:a16="http://schemas.microsoft.com/office/drawing/2014/main" id="{679B6125-4F27-422D-BD09-561C5044FDD4}"/>
+                <a16:creationId xmlns:a16="http://schemas.microsoft.com/office/drawing/2014/main" id="{D4BFD821-A107-40D1-8BA0-4F2402090116}"/>
               </a:ext>
             </a:extLst>
           </p:cNvPr>
@@ -5693,7 +5757,7 @@
         </p:nvSpPr>
         <p:spPr>
           <a:xfrm>
-            <a:off x="7577279" y="3119483"/>
+            <a:off x="7166158" y="2938724"/>
             <a:ext cx="1117988" cy="435649"/>
           </a:xfrm>
           <a:prstGeom prst="roundRect">
@@ -5764,10 +5828,10 @@
       </p:sp>
       <p:sp>
         <p:nvSpPr>
-          <p:cNvPr id="116" name="Rectangle: Rounded Corners 115">
+          <p:cNvPr id="147" name="Rectangle: Rounded Corners 146">
             <a:extLst>
               <a:ext uri="{FF2B5EF4-FFF2-40B4-BE49-F238E27FC236}">
-                <a16:creationId xmlns:a16="http://schemas.microsoft.com/office/drawing/2014/main" id="{F4A47F35-B885-449F-A8D7-EE71D8E879A4}"/>
+                <a16:creationId xmlns:a16="http://schemas.microsoft.com/office/drawing/2014/main" id="{B577ABAB-7399-4F5C-ADDF-4288F7C9EA0C}"/>
               </a:ext>
             </a:extLst>
           </p:cNvPr>
@@ -5776,7 +5840,7 @@
         </p:nvSpPr>
         <p:spPr>
           <a:xfrm>
-            <a:off x="6418984" y="3634451"/>
+            <a:off x="6007863" y="3453692"/>
             <a:ext cx="1111947" cy="435649"/>
           </a:xfrm>
           <a:prstGeom prst="roundRect">
@@ -5847,10 +5911,10 @@
       </p:sp>
       <p:sp>
         <p:nvSpPr>
-          <p:cNvPr id="117" name="Rectangle: Rounded Corners 116">
+          <p:cNvPr id="148" name="Rectangle: Rounded Corners 147">
             <a:extLst>
               <a:ext uri="{FF2B5EF4-FFF2-40B4-BE49-F238E27FC236}">
-                <a16:creationId xmlns:a16="http://schemas.microsoft.com/office/drawing/2014/main" id="{6696D866-D6F8-48FC-AA72-9C6876718DD8}"/>
+                <a16:creationId xmlns:a16="http://schemas.microsoft.com/office/drawing/2014/main" id="{1CD5C559-9101-4BDC-B60A-9EDE9ABD91B0}"/>
               </a:ext>
             </a:extLst>
           </p:cNvPr>
@@ -5859,7 +5923,7 @@
         </p:nvSpPr>
         <p:spPr>
           <a:xfrm>
-            <a:off x="7547617" y="4210415"/>
+            <a:off x="7136496" y="4029656"/>
             <a:ext cx="1142296" cy="435649"/>
           </a:xfrm>
           <a:prstGeom prst="roundRect">
@@ -5904,10 +5968,13 @@
                   </a:schemeClr>
                 </a:solidFill>
               </a:rPr>
-              <a:t>RJ12 I2C max. 10m bis </a:t>
-            </a:r>
-            <a:r>
-              <a:rPr lang="de-DE" sz="1200" dirty="0" err="1">
+              <a:t>0,14mm2</a:t>
+            </a:r>
+          </a:p>
+          <a:p>
+            <a:pPr algn="ctr"/>
+            <a:r>
+              <a:rPr lang="de-DE" sz="1200" dirty="0">
                 <a:solidFill>
                   <a:schemeClr val="tx1">
                     <a:lumMod val="65000"/>
@@ -5915,25 +5982,17 @@
                   </a:schemeClr>
                 </a:solidFill>
               </a:rPr>
-              <a:t>Raspi</a:t>
-            </a:r>
-            <a:endParaRPr lang="de-DE" sz="1200" dirty="0">
-              <a:solidFill>
-                <a:schemeClr val="tx1">
-                  <a:lumMod val="65000"/>
-                  <a:lumOff val="35000"/>
-                </a:schemeClr>
-              </a:solidFill>
-            </a:endParaRPr>
-          </a:p>
-        </p:txBody>
-      </p:sp>
-      <p:sp>
-        <p:nvSpPr>
-          <p:cNvPr id="118" name="Rectangle: Rounded Corners 117">
+              <a:t>20cm</a:t>
+            </a:r>
+          </a:p>
+        </p:txBody>
+      </p:sp>
+      <p:sp>
+        <p:nvSpPr>
+          <p:cNvPr id="149" name="Rectangle: Rounded Corners 148">
             <a:extLst>
               <a:ext uri="{FF2B5EF4-FFF2-40B4-BE49-F238E27FC236}">
-                <a16:creationId xmlns:a16="http://schemas.microsoft.com/office/drawing/2014/main" id="{E703716A-B7A8-4E7C-BD38-8E1E4D519E00}"/>
+                <a16:creationId xmlns:a16="http://schemas.microsoft.com/office/drawing/2014/main" id="{F4C927F3-A868-4039-BD15-DC9B74ED575D}"/>
               </a:ext>
             </a:extLst>
           </p:cNvPr>
@@ -5942,7 +6001,7 @@
         </p:nvSpPr>
         <p:spPr>
           <a:xfrm>
-            <a:off x="4066564" y="3641280"/>
+            <a:off x="3655443" y="3460521"/>
             <a:ext cx="928768" cy="435649"/>
           </a:xfrm>
           <a:prstGeom prst="roundRect">
@@ -5987,7 +6046,7 @@
                   </a:schemeClr>
                 </a:solidFill>
               </a:rPr>
-              <a:t>0,75mm</a:t>
+              <a:t>1,5mm</a:t>
             </a:r>
             <a:r>
               <a:rPr lang="de-DE" sz="1200" baseline="30000" dirty="0">
@@ -6012,17 +6071,17 @@
                   </a:schemeClr>
                 </a:solidFill>
               </a:rPr>
-              <a:t>???cm</a:t>
-            </a:r>
-          </a:p>
-        </p:txBody>
-      </p:sp>
-      <p:sp>
-        <p:nvSpPr>
-          <p:cNvPr id="120" name="Rectangle: Rounded Corners 119">
+              <a:t>300cm</a:t>
+            </a:r>
+          </a:p>
+        </p:txBody>
+      </p:sp>
+      <p:sp>
+        <p:nvSpPr>
+          <p:cNvPr id="150" name="Rectangle: Rounded Corners 149">
             <a:extLst>
               <a:ext uri="{FF2B5EF4-FFF2-40B4-BE49-F238E27FC236}">
-                <a16:creationId xmlns:a16="http://schemas.microsoft.com/office/drawing/2014/main" id="{6A7A0E3F-D7C2-44FE-B8AB-8B65297E8D48}"/>
+                <a16:creationId xmlns:a16="http://schemas.microsoft.com/office/drawing/2014/main" id="{7A66F526-7ADF-465F-8A0D-EBD06EDD518E}"/>
               </a:ext>
             </a:extLst>
           </p:cNvPr>
@@ -6031,7 +6090,7 @@
         </p:nvSpPr>
         <p:spPr>
           <a:xfrm>
-            <a:off x="4090569" y="4765886"/>
+            <a:off x="3679448" y="4585127"/>
             <a:ext cx="880758" cy="435649"/>
           </a:xfrm>
           <a:prstGeom prst="roundRect">
@@ -6108,10 +6167,10 @@
       </p:sp>
       <p:sp>
         <p:nvSpPr>
-          <p:cNvPr id="122" name="Oval 121">
+          <p:cNvPr id="151" name="Rectangle: Rounded Corners 150">
             <a:extLst>
               <a:ext uri="{FF2B5EF4-FFF2-40B4-BE49-F238E27FC236}">
-                <a16:creationId xmlns:a16="http://schemas.microsoft.com/office/drawing/2014/main" id="{5AE6222C-DBAD-414C-8B3B-C28840F208D0}"/>
+                <a16:creationId xmlns:a16="http://schemas.microsoft.com/office/drawing/2014/main" id="{0A5B7245-176E-4A37-95E8-CA3E41C437DA}"/>
               </a:ext>
             </a:extLst>
           </p:cNvPr>
@@ -6120,163 +6179,7 @@
         </p:nvSpPr>
         <p:spPr>
           <a:xfrm>
-            <a:off x="1807896" y="3631103"/>
-            <a:ext cx="271947" cy="278188"/>
-          </a:xfrm>
-          <a:prstGeom prst="ellipse">
-            <a:avLst/>
-          </a:prstGeom>
-        </p:spPr>
-        <p:style>
-          <a:lnRef idx="2">
-            <a:schemeClr val="accent6">
-              <a:shade val="50000"/>
-            </a:schemeClr>
-          </a:lnRef>
-          <a:fillRef idx="1">
-            <a:schemeClr val="accent6"/>
-          </a:fillRef>
-          <a:effectRef idx="0">
-            <a:schemeClr val="accent6"/>
-          </a:effectRef>
-          <a:fontRef idx="minor">
-            <a:schemeClr val="lt1"/>
-          </a:fontRef>
-        </p:style>
-        <p:txBody>
-          <a:bodyPr lIns="0" tIns="0" rIns="0" bIns="0" rtlCol="0" anchor="ctr"/>
-          <a:lstStyle/>
-          <a:p>
-            <a:pPr algn="ctr"/>
-            <a:r>
-              <a:rPr lang="de-DE" sz="1200" b="1" dirty="0">
-                <a:latin typeface="Arial" panose="020B0604020202020204" pitchFamily="34" charset="0"/>
-                <a:cs typeface="Arial" panose="020B0604020202020204" pitchFamily="34" charset="0"/>
-              </a:rPr>
-              <a:t>1</a:t>
-            </a:r>
-          </a:p>
-        </p:txBody>
-      </p:sp>
-      <p:sp>
-        <p:nvSpPr>
-          <p:cNvPr id="51" name="Oval 50">
-            <a:extLst>
-              <a:ext uri="{FF2B5EF4-FFF2-40B4-BE49-F238E27FC236}">
-                <a16:creationId xmlns:a16="http://schemas.microsoft.com/office/drawing/2014/main" id="{E1C83C4D-0B39-4C11-AE50-F1E7253B88A8}"/>
-              </a:ext>
-            </a:extLst>
-          </p:cNvPr>
-          <p:cNvSpPr/>
-          <p:nvPr/>
-        </p:nvSpPr>
-        <p:spPr>
-          <a:xfrm>
-            <a:off x="430331" y="3782767"/>
-            <a:ext cx="271947" cy="278188"/>
-          </a:xfrm>
-          <a:prstGeom prst="ellipse">
-            <a:avLst/>
-          </a:prstGeom>
-        </p:spPr>
-        <p:style>
-          <a:lnRef idx="2">
-            <a:schemeClr val="accent6">
-              <a:shade val="50000"/>
-            </a:schemeClr>
-          </a:lnRef>
-          <a:fillRef idx="1">
-            <a:schemeClr val="accent6"/>
-          </a:fillRef>
-          <a:effectRef idx="0">
-            <a:schemeClr val="accent6"/>
-          </a:effectRef>
-          <a:fontRef idx="minor">
-            <a:schemeClr val="lt1"/>
-          </a:fontRef>
-        </p:style>
-        <p:txBody>
-          <a:bodyPr lIns="0" tIns="0" rIns="0" bIns="0" rtlCol="0" anchor="ctr"/>
-          <a:lstStyle/>
-          <a:p>
-            <a:pPr algn="ctr"/>
-            <a:r>
-              <a:rPr lang="de-DE" sz="1200" b="1" dirty="0">
-                <a:latin typeface="Arial" panose="020B0604020202020204" pitchFamily="34" charset="0"/>
-                <a:cs typeface="Arial" panose="020B0604020202020204" pitchFamily="34" charset="0"/>
-              </a:rPr>
-              <a:t>3</a:t>
-            </a:r>
-          </a:p>
-        </p:txBody>
-      </p:sp>
-      <p:sp>
-        <p:nvSpPr>
-          <p:cNvPr id="52" name="Oval 51">
-            <a:extLst>
-              <a:ext uri="{FF2B5EF4-FFF2-40B4-BE49-F238E27FC236}">
-                <a16:creationId xmlns:a16="http://schemas.microsoft.com/office/drawing/2014/main" id="{98200835-B16C-45BA-82E9-C5B1227389FF}"/>
-              </a:ext>
-            </a:extLst>
-          </p:cNvPr>
-          <p:cNvSpPr/>
-          <p:nvPr/>
-        </p:nvSpPr>
-        <p:spPr>
-          <a:xfrm>
-            <a:off x="1164498" y="3681846"/>
-            <a:ext cx="271947" cy="278188"/>
-          </a:xfrm>
-          <a:prstGeom prst="ellipse">
-            <a:avLst/>
-          </a:prstGeom>
-        </p:spPr>
-        <p:style>
-          <a:lnRef idx="2">
-            <a:schemeClr val="accent6">
-              <a:shade val="50000"/>
-            </a:schemeClr>
-          </a:lnRef>
-          <a:fillRef idx="1">
-            <a:schemeClr val="accent6"/>
-          </a:fillRef>
-          <a:effectRef idx="0">
-            <a:schemeClr val="accent6"/>
-          </a:effectRef>
-          <a:fontRef idx="minor">
-            <a:schemeClr val="lt1"/>
-          </a:fontRef>
-        </p:style>
-        <p:txBody>
-          <a:bodyPr lIns="0" tIns="0" rIns="0" bIns="0" rtlCol="0" anchor="ctr"/>
-          <a:lstStyle/>
-          <a:p>
-            <a:pPr algn="ctr"/>
-            <a:r>
-              <a:rPr lang="de-DE" sz="1200" b="1" dirty="0">
-                <a:latin typeface="Arial" panose="020B0604020202020204" pitchFamily="34" charset="0"/>
-                <a:cs typeface="Arial" panose="020B0604020202020204" pitchFamily="34" charset="0"/>
-              </a:rPr>
-              <a:t>4</a:t>
-            </a:r>
-          </a:p>
-        </p:txBody>
-      </p:sp>
-      <p:sp>
-        <p:nvSpPr>
-          <p:cNvPr id="54" name="Rectangle: Rounded Corners 53">
-            <a:extLst>
-              <a:ext uri="{FF2B5EF4-FFF2-40B4-BE49-F238E27FC236}">
-                <a16:creationId xmlns:a16="http://schemas.microsoft.com/office/drawing/2014/main" id="{F7C97A5C-AD9D-427B-8606-7157B413AB50}"/>
-              </a:ext>
-            </a:extLst>
-          </p:cNvPr>
-          <p:cNvSpPr/>
-          <p:nvPr/>
-        </p:nvSpPr>
-        <p:spPr>
-          <a:xfrm>
-            <a:off x="5211182" y="6003087"/>
+            <a:off x="4800061" y="5822328"/>
             <a:ext cx="1207802" cy="698019"/>
           </a:xfrm>
           <a:prstGeom prst="roundRect">
@@ -6319,10 +6222,10 @@
       </p:sp>
       <p:pic>
         <p:nvPicPr>
-          <p:cNvPr id="55" name="Picture 2" descr="Bildergebnis fÃ¼r strom">
+          <p:cNvPr id="152" name="Picture 2" descr="Bildergebnis fÃ¼r strom">
             <a:extLst>
               <a:ext uri="{FF2B5EF4-FFF2-40B4-BE49-F238E27FC236}">
-                <a16:creationId xmlns:a16="http://schemas.microsoft.com/office/drawing/2014/main" id="{776CF1C9-66FE-4E48-A012-6CADA2A42C16}"/>
+                <a16:creationId xmlns:a16="http://schemas.microsoft.com/office/drawing/2014/main" id="{3FCD29C0-CE2D-4AC6-A31E-2B180BBAB271}"/>
               </a:ext>
             </a:extLst>
           </p:cNvPr>
@@ -6346,7 +6249,7 @@
         </p:blipFill>
         <p:spPr bwMode="auto">
           <a:xfrm>
-            <a:off x="5636507" y="6099060"/>
+            <a:off x="5225386" y="5918301"/>
             <a:ext cx="338627" cy="329832"/>
           </a:xfrm>
           <a:prstGeom prst="rect">
@@ -6366,10 +6269,10 @@
       </p:pic>
       <p:sp>
         <p:nvSpPr>
-          <p:cNvPr id="64" name="Rectangle: Rounded Corners 63">
+          <p:cNvPr id="153" name="Rectangle: Rounded Corners 152">
             <a:extLst>
               <a:ext uri="{FF2B5EF4-FFF2-40B4-BE49-F238E27FC236}">
-                <a16:creationId xmlns:a16="http://schemas.microsoft.com/office/drawing/2014/main" id="{6BA6F3E3-0E6A-477F-AF5A-70FABAA33356}"/>
+                <a16:creationId xmlns:a16="http://schemas.microsoft.com/office/drawing/2014/main" id="{40F16120-8154-4815-BA93-655AD44136F4}"/>
               </a:ext>
             </a:extLst>
           </p:cNvPr>
@@ -6378,7 +6281,7 @@
         </p:nvSpPr>
         <p:spPr>
           <a:xfrm>
-            <a:off x="4907548" y="5371242"/>
+            <a:off x="4496427" y="5190483"/>
             <a:ext cx="1753722" cy="435649"/>
           </a:xfrm>
           <a:prstGeom prst="roundRect">
@@ -6430,296 +6333,35 @@
       </p:sp>
       <p:sp>
         <p:nvSpPr>
-          <p:cNvPr id="67" name="Rectangle: Rounded Corners 66">
+          <p:cNvPr id="160" name="TextBox 159">
             <a:extLst>
               <a:ext uri="{FF2B5EF4-FFF2-40B4-BE49-F238E27FC236}">
-                <a16:creationId xmlns:a16="http://schemas.microsoft.com/office/drawing/2014/main" id="{F992634C-C0CE-44AF-A7C1-5F3CB1D96F13}"/>
+                <a16:creationId xmlns:a16="http://schemas.microsoft.com/office/drawing/2014/main" id="{6EC00705-9399-49E7-94E3-862B8452A553}"/>
               </a:ext>
             </a:extLst>
           </p:cNvPr>
-          <p:cNvSpPr/>
+          <p:cNvSpPr txBox="1"/>
           <p:nvPr/>
         </p:nvSpPr>
         <p:spPr>
           <a:xfrm>
-            <a:off x="7439575" y="611539"/>
-            <a:ext cx="1175539" cy="489660"/>
+            <a:off x="5571580" y="1585972"/>
+            <a:ext cx="1488035" cy="830997"/>
           </a:xfrm>
-          <a:prstGeom prst="roundRect">
+          <a:prstGeom prst="rect">
             <a:avLst/>
           </a:prstGeom>
-          <a:ln>
-            <a:solidFill>
-              <a:schemeClr val="bg1">
-                <a:lumMod val="50000"/>
-              </a:schemeClr>
-            </a:solidFill>
-          </a:ln>
+          <a:noFill/>
         </p:spPr>
-        <p:style>
-          <a:lnRef idx="3">
-            <a:schemeClr val="lt1"/>
-          </a:lnRef>
-          <a:fillRef idx="1">
-            <a:schemeClr val="accent3"/>
-          </a:fillRef>
-          <a:effectRef idx="1">
-            <a:schemeClr val="accent3"/>
-          </a:effectRef>
-          <a:fontRef idx="minor">
-            <a:schemeClr val="lt1"/>
-          </a:fontRef>
-        </p:style>
-        <p:txBody>
-          <a:bodyPr rtlCol="0" anchor="ctr"/>
+        <p:txBody>
+          <a:bodyPr wrap="none" rtlCol="0">
+            <a:spAutoFit/>
+          </a:bodyPr>
           <a:lstStyle/>
           <a:p>
             <a:pPr algn="ctr"/>
             <a:r>
-              <a:rPr lang="de-DE" sz="1400" dirty="0"/>
-              <a:t>LED </a:t>
-            </a:r>
-            <a:r>
-              <a:rPr lang="de-DE" sz="1400" dirty="0" err="1"/>
-              <a:t>Beleuchung</a:t>
-            </a:r>
-            <a:endParaRPr lang="de-DE" sz="1400" b="1" dirty="0"/>
-          </a:p>
-        </p:txBody>
-      </p:sp>
-      <p:grpSp>
-        <p:nvGrpSpPr>
-          <p:cNvPr id="68" name="Group 67">
-            <a:extLst>
-              <a:ext uri="{FF2B5EF4-FFF2-40B4-BE49-F238E27FC236}">
-                <a16:creationId xmlns:a16="http://schemas.microsoft.com/office/drawing/2014/main" id="{D38494B5-5321-497D-A62C-E3A6FEBE48DE}"/>
-              </a:ext>
-            </a:extLst>
-          </p:cNvPr>
-          <p:cNvGrpSpPr/>
-          <p:nvPr/>
-        </p:nvGrpSpPr>
-        <p:grpSpPr>
-          <a:xfrm>
-            <a:off x="4934702" y="502980"/>
-            <a:ext cx="1258360" cy="698018"/>
-            <a:chOff x="3489595" y="3906884"/>
-            <a:chExt cx="1258360" cy="698018"/>
-          </a:xfrm>
-        </p:grpSpPr>
-        <p:sp>
-          <p:nvSpPr>
-            <p:cNvPr id="69" name="Rectangle: Rounded Corners 68">
-              <a:extLst>
-                <a:ext uri="{FF2B5EF4-FFF2-40B4-BE49-F238E27FC236}">
-                  <a16:creationId xmlns:a16="http://schemas.microsoft.com/office/drawing/2014/main" id="{3C877823-35C9-4A65-BFF0-813DB2D13421}"/>
-                </a:ext>
-              </a:extLst>
-            </p:cNvPr>
-            <p:cNvSpPr/>
-            <p:nvPr/>
-          </p:nvSpPr>
-          <p:spPr>
-            <a:xfrm>
-              <a:off x="3489595" y="3906884"/>
-              <a:ext cx="1258360" cy="698018"/>
-            </a:xfrm>
-            <a:prstGeom prst="roundRect">
-              <a:avLst/>
-            </a:prstGeom>
-            <a:ln>
-              <a:solidFill>
-                <a:schemeClr val="bg1">
-                  <a:lumMod val="50000"/>
-                </a:schemeClr>
-              </a:solidFill>
-            </a:ln>
-          </p:spPr>
-          <p:style>
-            <a:lnRef idx="3">
-              <a:schemeClr val="lt1"/>
-            </a:lnRef>
-            <a:fillRef idx="1">
-              <a:schemeClr val="accent3"/>
-            </a:fillRef>
-            <a:effectRef idx="1">
-              <a:schemeClr val="accent3"/>
-            </a:effectRef>
-            <a:fontRef idx="minor">
-              <a:schemeClr val="lt1"/>
-            </a:fontRef>
-          </p:style>
-          <p:txBody>
-            <a:bodyPr rtlCol="0" anchor="b"/>
-            <a:lstStyle/>
-            <a:p>
-              <a:pPr algn="ctr"/>
-              <a:r>
-                <a:rPr lang="de-DE" sz="1200" dirty="0"/>
-                <a:t>Netzteil ???V </a:t>
-              </a:r>
-              <a:r>
-                <a:rPr lang="de-DE" sz="1200" dirty="0" err="1"/>
-                <a:t>ac</a:t>
-              </a:r>
-              <a:r>
-                <a:rPr lang="de-DE" sz="1200" dirty="0"/>
-                <a:t> </a:t>
-              </a:r>
-            </a:p>
-          </p:txBody>
-        </p:sp>
-        <p:pic>
-          <p:nvPicPr>
-            <p:cNvPr id="70" name="Picture 2" descr="Bildergebnis fÃ¼r strom">
-              <a:extLst>
-                <a:ext uri="{FF2B5EF4-FFF2-40B4-BE49-F238E27FC236}">
-                  <a16:creationId xmlns:a16="http://schemas.microsoft.com/office/drawing/2014/main" id="{83614865-E327-4B5D-B92D-43CF5812B382}"/>
-                </a:ext>
-              </a:extLst>
-            </p:cNvPr>
-            <p:cNvPicPr>
-              <a:picLocks noChangeAspect="1" noChangeArrowheads="1"/>
-            </p:cNvPicPr>
-            <p:nvPr/>
-          </p:nvPicPr>
-          <p:blipFill>
-            <a:blip r:embed="rId6">
-              <a:extLst>
-                <a:ext uri="{28A0092B-C50C-407E-A947-70E740481C1C}">
-                  <a14:useLocalDpi xmlns:a14="http://schemas.microsoft.com/office/drawing/2010/main" val="0"/>
-                </a:ext>
-              </a:extLst>
-            </a:blip>
-            <a:srcRect/>
-            <a:stretch>
-              <a:fillRect/>
-            </a:stretch>
-          </p:blipFill>
-          <p:spPr bwMode="auto">
-            <a:xfrm>
-              <a:off x="3905983" y="4019713"/>
-              <a:ext cx="338627" cy="329832"/>
-            </a:xfrm>
-            <a:prstGeom prst="rect">
-              <a:avLst/>
-            </a:prstGeom>
-            <a:noFill/>
-            <a:extLst>
-              <a:ext uri="{909E8E84-426E-40DD-AFC4-6F175D3DCCD1}">
-                <a14:hiddenFill xmlns:a14="http://schemas.microsoft.com/office/drawing/2010/main">
-                  <a:solidFill>
-                    <a:srgbClr val="FFFFFF"/>
-                  </a:solidFill>
-                </a14:hiddenFill>
-              </a:ext>
-            </a:extLst>
-          </p:spPr>
-        </p:pic>
-      </p:grpSp>
-      <p:cxnSp>
-        <p:nvCxnSpPr>
-          <p:cNvPr id="71" name="Straight Arrow Connector 70">
-            <a:extLst>
-              <a:ext uri="{FF2B5EF4-FFF2-40B4-BE49-F238E27FC236}">
-                <a16:creationId xmlns:a16="http://schemas.microsoft.com/office/drawing/2014/main" id="{9B5EC248-DEB8-4C71-BA34-93F30CED7A42}"/>
-              </a:ext>
-            </a:extLst>
-          </p:cNvPr>
-          <p:cNvCxnSpPr>
-            <a:cxnSpLocks/>
-            <a:stCxn id="67" idx="1"/>
-            <a:endCxn id="69" idx="3"/>
-          </p:cNvCxnSpPr>
-          <p:nvPr/>
-        </p:nvCxnSpPr>
-        <p:spPr>
-          <a:xfrm flipH="1" flipV="1">
-            <a:off x="6193062" y="851989"/>
-            <a:ext cx="1246513" cy="4380"/>
-          </a:xfrm>
-          <a:prstGeom prst="straightConnector1">
-            <a:avLst/>
-          </a:prstGeom>
-          <a:ln w="19050" cap="rnd" cmpd="sng">
-            <a:solidFill>
-              <a:schemeClr val="tx1">
-                <a:lumMod val="50000"/>
-                <a:lumOff val="50000"/>
-              </a:schemeClr>
-            </a:solidFill>
-            <a:miter lim="800000"/>
-            <a:headEnd type="none" w="med" len="med"/>
-            <a:tailEnd type="none" w="med" len="med"/>
-          </a:ln>
-        </p:spPr>
-        <p:style>
-          <a:lnRef idx="1">
-            <a:schemeClr val="accent1"/>
-          </a:lnRef>
-          <a:fillRef idx="0">
-            <a:schemeClr val="accent1"/>
-          </a:fillRef>
-          <a:effectRef idx="0">
-            <a:schemeClr val="accent1"/>
-          </a:effectRef>
-          <a:fontRef idx="minor">
-            <a:schemeClr val="tx1"/>
-          </a:fontRef>
-        </p:style>
-      </p:cxnSp>
-      <p:sp>
-        <p:nvSpPr>
-          <p:cNvPr id="72" name="Rectangle: Rounded Corners 71">
-            <a:extLst>
-              <a:ext uri="{FF2B5EF4-FFF2-40B4-BE49-F238E27FC236}">
-                <a16:creationId xmlns:a16="http://schemas.microsoft.com/office/drawing/2014/main" id="{8079BA6D-0415-4C85-8C51-1B6DC6136C38}"/>
-              </a:ext>
-            </a:extLst>
-          </p:cNvPr>
-          <p:cNvSpPr/>
-          <p:nvPr/>
-        </p:nvSpPr>
-        <p:spPr>
-          <a:xfrm>
-            <a:off x="6358563" y="643668"/>
-            <a:ext cx="928768" cy="435649"/>
-          </a:xfrm>
-          <a:prstGeom prst="roundRect">
-            <a:avLst/>
-          </a:prstGeom>
-          <a:solidFill>
-            <a:srgbClr val="FFC000"/>
-          </a:solidFill>
-          <a:ln>
-            <a:solidFill>
-              <a:schemeClr val="bg1">
-                <a:lumMod val="50000"/>
-              </a:schemeClr>
-            </a:solidFill>
-          </a:ln>
-        </p:spPr>
-        <p:style>
-          <a:lnRef idx="3">
-            <a:schemeClr val="lt1"/>
-          </a:lnRef>
-          <a:fillRef idx="1">
-            <a:schemeClr val="accent3"/>
-          </a:fillRef>
-          <a:effectRef idx="1">
-            <a:schemeClr val="accent3"/>
-          </a:effectRef>
-          <a:fontRef idx="minor">
-            <a:schemeClr val="lt1"/>
-          </a:fontRef>
-        </p:style>
-        <p:txBody>
-          <a:bodyPr rtlCol="0" anchor="ctr"/>
-          <a:lstStyle/>
-          <a:p>
-            <a:pPr algn="ctr"/>
-            <a:r>
-              <a:rPr lang="de-DE" sz="1200" dirty="0">
+              <a:rPr lang="de-DE" sz="1600" dirty="0" err="1">
                 <a:solidFill>
                   <a:schemeClr val="tx1">
                     <a:lumMod val="65000"/>
@@ -6727,10 +6369,10 @@
                   </a:schemeClr>
                 </a:solidFill>
               </a:rPr>
-              <a:t>0,75mm</a:t>
-            </a:r>
-            <a:r>
-              <a:rPr lang="de-DE" sz="1200" baseline="30000" dirty="0">
+              <a:t>Belegtmeldung</a:t>
+            </a:r>
+            <a:r>
+              <a:rPr lang="de-DE" sz="1600" dirty="0">
                 <a:solidFill>
                   <a:schemeClr val="tx1">
                     <a:lumMod val="65000"/>
@@ -6738,13 +6380,13 @@
                   </a:schemeClr>
                 </a:solidFill>
               </a:rPr>
-              <a:t>2</a:t>
+              <a:t> </a:t>
             </a:r>
           </a:p>
           <a:p>
             <a:pPr algn="ctr"/>
             <a:r>
-              <a:rPr lang="de-DE" sz="1200" dirty="0">
+              <a:rPr lang="de-DE" sz="1600" dirty="0">
                 <a:solidFill>
                   <a:schemeClr val="tx1">
                     <a:lumMod val="65000"/>
@@ -6752,46 +6394,21 @@
                   </a:schemeClr>
                 </a:solidFill>
               </a:rPr>
-              <a:t>???cm</a:t>
-            </a:r>
-          </a:p>
-        </p:txBody>
-      </p:sp>
-      <p:sp>
-        <p:nvSpPr>
-          <p:cNvPr id="9" name="TextBox 8">
-            <a:extLst>
-              <a:ext uri="{FF2B5EF4-FFF2-40B4-BE49-F238E27FC236}">
-                <a16:creationId xmlns:a16="http://schemas.microsoft.com/office/drawing/2014/main" id="{C900EFE4-D83D-47A1-9A08-781C2F6E4252}"/>
-              </a:ext>
-            </a:extLst>
-          </p:cNvPr>
-          <p:cNvSpPr txBox="1"/>
-          <p:nvPr/>
-        </p:nvSpPr>
-        <p:spPr>
-          <a:xfrm>
-            <a:off x="4670387" y="2447369"/>
-            <a:ext cx="2694969" cy="338554"/>
-          </a:xfrm>
-          <a:prstGeom prst="rect">
-            <a:avLst/>
-          </a:prstGeom>
-          <a:noFill/>
-        </p:spPr>
-        <p:txBody>
-          <a:bodyPr wrap="none" rtlCol="0">
-            <a:spAutoFit/>
-          </a:bodyPr>
-          <a:lstStyle/>
-          <a:p>
-            <a:r>
-              <a:rPr lang="de-DE" sz="1600" dirty="0" err="1"/>
-              <a:t>Belegtmeldung</a:t>
-            </a:r>
-            <a:r>
-              <a:rPr lang="de-DE" sz="1600" dirty="0"/>
-              <a:t> &amp; Schaltungen</a:t>
+              <a:t>&amp;</a:t>
+            </a:r>
+          </a:p>
+          <a:p>
+            <a:pPr algn="ctr"/>
+            <a:r>
+              <a:rPr lang="de-DE" sz="1600" dirty="0">
+                <a:solidFill>
+                  <a:schemeClr val="tx1">
+                    <a:lumMod val="65000"/>
+                    <a:lumOff val="35000"/>
+                  </a:schemeClr>
+                </a:solidFill>
+              </a:rPr>
+              <a:t>Schaltungen</a:t>
             </a:r>
           </a:p>
         </p:txBody>

</xml_diff>